<commit_message>
Edited chap 3 and 7 of the UG
</commit_message>
<xml_diff>
--- a/docs/diagrams/Ui-Labelled.pptx
+++ b/docs/diagrams/Ui-Labelled.pptx
@@ -105,6 +105,11 @@
       </a:defRPr>
     </a:lvl9pPr>
   </p:defaultTextStyle>
+  <p:extLst>
+    <p:ext uri="{EFAFB233-063F-42B5-8137-9DF3F51BA10A}">
+      <p15:sldGuideLst xmlns:p15="http://schemas.microsoft.com/office/powerpoint/2012/main"/>
+    </p:ext>
+  </p:extLst>
 </p:presentation>
 </file>
 
@@ -257,7 +262,7 @@
           <a:p>
             <a:fld id="{FB4689D7-AAEA-4A03-BD8E-229258DDF9B0}" type="datetimeFigureOut">
               <a:rPr lang="en-SG" smtClean="0"/>
-              <a:t>29/10/2020</a:t>
+              <a:t>7/11/2020</a:t>
             </a:fld>
             <a:endParaRPr lang="en-SG"/>
           </a:p>
@@ -457,7 +462,7 @@
           <a:p>
             <a:fld id="{FB4689D7-AAEA-4A03-BD8E-229258DDF9B0}" type="datetimeFigureOut">
               <a:rPr lang="en-SG" smtClean="0"/>
-              <a:t>29/10/2020</a:t>
+              <a:t>7/11/2020</a:t>
             </a:fld>
             <a:endParaRPr lang="en-SG"/>
           </a:p>
@@ -667,7 +672,7 @@
           <a:p>
             <a:fld id="{FB4689D7-AAEA-4A03-BD8E-229258DDF9B0}" type="datetimeFigureOut">
               <a:rPr lang="en-SG" smtClean="0"/>
-              <a:t>29/10/2020</a:t>
+              <a:t>7/11/2020</a:t>
             </a:fld>
             <a:endParaRPr lang="en-SG"/>
           </a:p>
@@ -867,7 +872,7 @@
           <a:p>
             <a:fld id="{FB4689D7-AAEA-4A03-BD8E-229258DDF9B0}" type="datetimeFigureOut">
               <a:rPr lang="en-SG" smtClean="0"/>
-              <a:t>29/10/2020</a:t>
+              <a:t>7/11/2020</a:t>
             </a:fld>
             <a:endParaRPr lang="en-SG"/>
           </a:p>
@@ -1143,7 +1148,7 @@
           <a:p>
             <a:fld id="{FB4689D7-AAEA-4A03-BD8E-229258DDF9B0}" type="datetimeFigureOut">
               <a:rPr lang="en-SG" smtClean="0"/>
-              <a:t>29/10/2020</a:t>
+              <a:t>7/11/2020</a:t>
             </a:fld>
             <a:endParaRPr lang="en-SG"/>
           </a:p>
@@ -1411,7 +1416,7 @@
           <a:p>
             <a:fld id="{FB4689D7-AAEA-4A03-BD8E-229258DDF9B0}" type="datetimeFigureOut">
               <a:rPr lang="en-SG" smtClean="0"/>
-              <a:t>29/10/2020</a:t>
+              <a:t>7/11/2020</a:t>
             </a:fld>
             <a:endParaRPr lang="en-SG"/>
           </a:p>
@@ -1826,7 +1831,7 @@
           <a:p>
             <a:fld id="{FB4689D7-AAEA-4A03-BD8E-229258DDF9B0}" type="datetimeFigureOut">
               <a:rPr lang="en-SG" smtClean="0"/>
-              <a:t>29/10/2020</a:t>
+              <a:t>7/11/2020</a:t>
             </a:fld>
             <a:endParaRPr lang="en-SG"/>
           </a:p>
@@ -1968,7 +1973,7 @@
           <a:p>
             <a:fld id="{FB4689D7-AAEA-4A03-BD8E-229258DDF9B0}" type="datetimeFigureOut">
               <a:rPr lang="en-SG" smtClean="0"/>
-              <a:t>29/10/2020</a:t>
+              <a:t>7/11/2020</a:t>
             </a:fld>
             <a:endParaRPr lang="en-SG"/>
           </a:p>
@@ -2081,7 +2086,7 @@
           <a:p>
             <a:fld id="{FB4689D7-AAEA-4A03-BD8E-229258DDF9B0}" type="datetimeFigureOut">
               <a:rPr lang="en-SG" smtClean="0"/>
-              <a:t>29/10/2020</a:t>
+              <a:t>7/11/2020</a:t>
             </a:fld>
             <a:endParaRPr lang="en-SG"/>
           </a:p>
@@ -2394,7 +2399,7 @@
           <a:p>
             <a:fld id="{FB4689D7-AAEA-4A03-BD8E-229258DDF9B0}" type="datetimeFigureOut">
               <a:rPr lang="en-SG" smtClean="0"/>
-              <a:t>29/10/2020</a:t>
+              <a:t>7/11/2020</a:t>
             </a:fld>
             <a:endParaRPr lang="en-SG"/>
           </a:p>
@@ -2683,7 +2688,7 @@
           <a:p>
             <a:fld id="{FB4689D7-AAEA-4A03-BD8E-229258DDF9B0}" type="datetimeFigureOut">
               <a:rPr lang="en-SG" smtClean="0"/>
-              <a:t>29/10/2020</a:t>
+              <a:t>7/11/2020</a:t>
             </a:fld>
             <a:endParaRPr lang="en-SG"/>
           </a:p>
@@ -2926,7 +2931,7 @@
           <a:p>
             <a:fld id="{FB4689D7-AAEA-4A03-BD8E-229258DDF9B0}" type="datetimeFigureOut">
               <a:rPr lang="en-SG" smtClean="0"/>
-              <a:t>29/10/2020</a:t>
+              <a:t>7/11/2020</a:t>
             </a:fld>
             <a:endParaRPr lang="en-SG"/>
           </a:p>
@@ -3343,612 +3348,429 @@
           <a:chExt cx="0" cy="0"/>
         </a:xfrm>
       </p:grpSpPr>
-      <p:pic>
-        <p:nvPicPr>
-          <p:cNvPr id="4" name="Picture 3">
-            <a:extLst>
-              <a:ext uri="{FF2B5EF4-FFF2-40B4-BE49-F238E27FC236}">
-                <a16:creationId xmlns:a16="http://schemas.microsoft.com/office/drawing/2014/main" id="{A1F6AF0F-078F-4D26-B5C4-901BB26551E5}"/>
-              </a:ext>
-            </a:extLst>
-          </p:cNvPr>
-          <p:cNvPicPr>
-            <a:picLocks noChangeAspect="1"/>
-          </p:cNvPicPr>
+      <p:grpSp>
+        <p:nvGrpSpPr>
+          <p:cNvPr id="3" name="Group 2">
+            <a:extLst>
+              <a:ext uri="{FF2B5EF4-FFF2-40B4-BE49-F238E27FC236}">
+                <a16:creationId xmlns:a16="http://schemas.microsoft.com/office/drawing/2014/main" id="{82354C25-1658-4C45-BB87-EF37BEBE2816}"/>
+              </a:ext>
+            </a:extLst>
+          </p:cNvPr>
+          <p:cNvGrpSpPr/>
           <p:nvPr/>
-        </p:nvPicPr>
-        <p:blipFill rotWithShape="1">
-          <a:blip r:embed="rId2"/>
-          <a:srcRect r="2059" b="8473"/>
-          <a:stretch/>
-        </p:blipFill>
-        <p:spPr>
+        </p:nvGrpSpPr>
+        <p:grpSpPr>
           <a:xfrm>
             <a:off x="1526166" y="305826"/>
             <a:ext cx="9375614" cy="6048597"/>
+            <a:chOff x="1526166" y="305826"/>
+            <a:chExt cx="9375614" cy="6048597"/>
           </a:xfrm>
-          <a:prstGeom prst="rect">
-            <a:avLst/>
-          </a:prstGeom>
-        </p:spPr>
-      </p:pic>
-      <p:sp>
-        <p:nvSpPr>
-          <p:cNvPr id="5" name="Rectangle 4">
-            <a:extLst>
-              <a:ext uri="{FF2B5EF4-FFF2-40B4-BE49-F238E27FC236}">
-                <a16:creationId xmlns:a16="http://schemas.microsoft.com/office/drawing/2014/main" id="{79BACA73-2A24-4F44-BB6A-A50621B37B5A}"/>
-              </a:ext>
-            </a:extLst>
-          </p:cNvPr>
-          <p:cNvSpPr/>
-          <p:nvPr/>
-        </p:nvSpPr>
-        <p:spPr>
-          <a:xfrm>
-            <a:off x="1580225" y="878889"/>
-            <a:ext cx="9250532" cy="479394"/>
-          </a:xfrm>
-          <a:prstGeom prst="rect">
-            <a:avLst/>
-          </a:prstGeom>
-          <a:noFill/>
-          <a:ln w="76200">
-            <a:solidFill>
-              <a:srgbClr val="FF0000"/>
-            </a:solidFill>
-          </a:ln>
-        </p:spPr>
-        <p:style>
-          <a:lnRef idx="2">
-            <a:schemeClr val="accent1">
-              <a:shade val="50000"/>
-            </a:schemeClr>
-          </a:lnRef>
-          <a:fillRef idx="1">
-            <a:schemeClr val="accent1"/>
-          </a:fillRef>
-          <a:effectRef idx="0">
-            <a:schemeClr val="accent1"/>
-          </a:effectRef>
-          <a:fontRef idx="minor">
-            <a:schemeClr val="lt1"/>
-          </a:fontRef>
-        </p:style>
-        <p:txBody>
-          <a:bodyPr rtlCol="0" anchor="ctr"/>
-          <a:lstStyle/>
-          <a:p>
-            <a:pPr algn="ctr"/>
-            <a:endParaRPr lang="en-SG"/>
-          </a:p>
-        </p:txBody>
-      </p:sp>
-      <p:sp>
-        <p:nvSpPr>
-          <p:cNvPr id="6" name="TextBox 5">
-            <a:extLst>
-              <a:ext uri="{FF2B5EF4-FFF2-40B4-BE49-F238E27FC236}">
-                <a16:creationId xmlns:a16="http://schemas.microsoft.com/office/drawing/2014/main" id="{5A1FE517-755A-4298-A59E-7ED79131C051}"/>
-              </a:ext>
-            </a:extLst>
-          </p:cNvPr>
-          <p:cNvSpPr txBox="1"/>
-          <p:nvPr/>
-        </p:nvSpPr>
-        <p:spPr>
-          <a:xfrm>
-            <a:off x="0" y="878889"/>
-            <a:ext cx="1205779" cy="646331"/>
-          </a:xfrm>
-          <a:prstGeom prst="rect">
-            <a:avLst/>
-          </a:prstGeom>
-          <a:noFill/>
-        </p:spPr>
-        <p:txBody>
-          <a:bodyPr wrap="none" rtlCol="0">
-            <a:spAutoFit/>
-          </a:bodyPr>
-          <a:lstStyle/>
-          <a:p>
-            <a:r>
-              <a:rPr lang="en-SG" dirty="0"/>
-              <a:t>Command </a:t>
-            </a:r>
-          </a:p>
-          <a:p>
-            <a:pPr algn="ctr"/>
-            <a:r>
-              <a:rPr lang="en-SG" dirty="0"/>
-              <a:t>Box</a:t>
-            </a:r>
-          </a:p>
-        </p:txBody>
-      </p:sp>
-      <p:sp>
-        <p:nvSpPr>
-          <p:cNvPr id="9" name="TextBox 8">
-            <a:extLst>
-              <a:ext uri="{FF2B5EF4-FFF2-40B4-BE49-F238E27FC236}">
-                <a16:creationId xmlns:a16="http://schemas.microsoft.com/office/drawing/2014/main" id="{412C1063-9131-468A-A214-8AA3949DD52D}"/>
-              </a:ext>
-            </a:extLst>
-          </p:cNvPr>
-          <p:cNvSpPr txBox="1"/>
-          <p:nvPr/>
-        </p:nvSpPr>
-        <p:spPr>
-          <a:xfrm>
-            <a:off x="84441" y="1847877"/>
-            <a:ext cx="815416" cy="646331"/>
-          </a:xfrm>
-          <a:prstGeom prst="rect">
-            <a:avLst/>
-          </a:prstGeom>
-          <a:noFill/>
-        </p:spPr>
-        <p:txBody>
-          <a:bodyPr wrap="none" rtlCol="0">
-            <a:spAutoFit/>
-          </a:bodyPr>
-          <a:lstStyle/>
-          <a:p>
-            <a:r>
-              <a:rPr lang="en-SG" dirty="0">
-                <a:ln w="3175">
-                  <a:noFill/>
-                </a:ln>
-              </a:rPr>
-              <a:t>Result </a:t>
-            </a:r>
-          </a:p>
-          <a:p>
-            <a:pPr algn="ctr"/>
-            <a:r>
-              <a:rPr lang="en-SG" dirty="0">
-                <a:ln w="3175">
-                  <a:noFill/>
-                </a:ln>
-              </a:rPr>
-              <a:t>Box</a:t>
-            </a:r>
-          </a:p>
-        </p:txBody>
-      </p:sp>
-      <p:sp>
-        <p:nvSpPr>
-          <p:cNvPr id="12" name="Rectangle 11">
-            <a:extLst>
-              <a:ext uri="{FF2B5EF4-FFF2-40B4-BE49-F238E27FC236}">
-                <a16:creationId xmlns:a16="http://schemas.microsoft.com/office/drawing/2014/main" id="{684EDA73-B0FB-441B-87F6-B4BEAA9A0E67}"/>
-              </a:ext>
-            </a:extLst>
-          </p:cNvPr>
-          <p:cNvSpPr/>
-          <p:nvPr/>
-        </p:nvSpPr>
-        <p:spPr>
-          <a:xfrm>
-            <a:off x="1580225" y="1483232"/>
-            <a:ext cx="9250532" cy="878228"/>
-          </a:xfrm>
-          <a:prstGeom prst="rect">
-            <a:avLst/>
-          </a:prstGeom>
-          <a:noFill/>
-          <a:ln w="76200">
-            <a:solidFill>
-              <a:srgbClr val="FFFF00"/>
-            </a:solidFill>
-          </a:ln>
-        </p:spPr>
-        <p:style>
-          <a:lnRef idx="2">
-            <a:schemeClr val="accent1">
-              <a:shade val="50000"/>
-            </a:schemeClr>
-          </a:lnRef>
-          <a:fillRef idx="1">
-            <a:schemeClr val="accent1"/>
-          </a:fillRef>
-          <a:effectRef idx="0">
-            <a:schemeClr val="accent1"/>
-          </a:effectRef>
-          <a:fontRef idx="minor">
-            <a:schemeClr val="lt1"/>
-          </a:fontRef>
-        </p:style>
-        <p:txBody>
-          <a:bodyPr rtlCol="0" anchor="ctr"/>
-          <a:lstStyle/>
-          <a:p>
-            <a:pPr algn="ctr"/>
-            <a:endParaRPr lang="en-SG"/>
-          </a:p>
-        </p:txBody>
-      </p:sp>
-      <p:sp>
-        <p:nvSpPr>
-          <p:cNvPr id="13" name="TextBox 12">
-            <a:extLst>
-              <a:ext uri="{FF2B5EF4-FFF2-40B4-BE49-F238E27FC236}">
-                <a16:creationId xmlns:a16="http://schemas.microsoft.com/office/drawing/2014/main" id="{F2B45F3D-6659-461B-9EA5-832BD5C7AECD}"/>
-              </a:ext>
-            </a:extLst>
-          </p:cNvPr>
-          <p:cNvSpPr txBox="1"/>
-          <p:nvPr/>
-        </p:nvSpPr>
-        <p:spPr>
-          <a:xfrm>
-            <a:off x="84441" y="3370434"/>
-            <a:ext cx="1209562" cy="646331"/>
-          </a:xfrm>
-          <a:prstGeom prst="rect">
-            <a:avLst/>
-          </a:prstGeom>
-          <a:noFill/>
-        </p:spPr>
-        <p:txBody>
-          <a:bodyPr wrap="none" rtlCol="0">
-            <a:spAutoFit/>
-          </a:bodyPr>
-          <a:lstStyle/>
-          <a:p>
-            <a:r>
-              <a:rPr lang="en-SG" dirty="0">
-                <a:ln w="3175">
-                  <a:noFill/>
-                </a:ln>
-              </a:rPr>
-              <a:t>Attractions</a:t>
-            </a:r>
-          </a:p>
-          <a:p>
-            <a:pPr algn="ctr"/>
-            <a:r>
-              <a:rPr lang="en-SG" dirty="0">
-                <a:ln w="3175">
-                  <a:noFill/>
-                </a:ln>
-              </a:rPr>
-              <a:t> Panel</a:t>
-            </a:r>
-          </a:p>
-        </p:txBody>
-      </p:sp>
-      <p:sp>
-        <p:nvSpPr>
-          <p:cNvPr id="17" name="Rectangle 16">
-            <a:extLst>
-              <a:ext uri="{FF2B5EF4-FFF2-40B4-BE49-F238E27FC236}">
-                <a16:creationId xmlns:a16="http://schemas.microsoft.com/office/drawing/2014/main" id="{C5A1F5BA-987B-4DBF-9800-962301479716}"/>
-              </a:ext>
-            </a:extLst>
-          </p:cNvPr>
-          <p:cNvSpPr/>
-          <p:nvPr/>
-        </p:nvSpPr>
-        <p:spPr>
-          <a:xfrm>
-            <a:off x="1580225" y="2494208"/>
-            <a:ext cx="4580878" cy="3737916"/>
-          </a:xfrm>
-          <a:prstGeom prst="rect">
-            <a:avLst/>
-          </a:prstGeom>
-          <a:noFill/>
-          <a:ln w="76200">
-            <a:solidFill>
-              <a:srgbClr val="00B050"/>
-            </a:solidFill>
-          </a:ln>
-        </p:spPr>
-        <p:style>
-          <a:lnRef idx="2">
-            <a:schemeClr val="accent1">
-              <a:shade val="50000"/>
-            </a:schemeClr>
-          </a:lnRef>
-          <a:fillRef idx="1">
-            <a:schemeClr val="accent1"/>
-          </a:fillRef>
-          <a:effectRef idx="0">
-            <a:schemeClr val="accent1"/>
-          </a:effectRef>
-          <a:fontRef idx="minor">
-            <a:schemeClr val="lt1"/>
-          </a:fontRef>
-        </p:style>
-        <p:txBody>
-          <a:bodyPr rtlCol="0" anchor="ctr"/>
-          <a:lstStyle/>
-          <a:p>
-            <a:pPr algn="ctr"/>
-            <a:endParaRPr lang="en-SG"/>
-          </a:p>
-        </p:txBody>
-      </p:sp>
-      <p:sp>
-        <p:nvSpPr>
-          <p:cNvPr id="19" name="Rectangle 18">
-            <a:extLst>
-              <a:ext uri="{FF2B5EF4-FFF2-40B4-BE49-F238E27FC236}">
-                <a16:creationId xmlns:a16="http://schemas.microsoft.com/office/drawing/2014/main" id="{2D36BB77-F985-412B-8295-A8366764B3FB}"/>
-              </a:ext>
-            </a:extLst>
-          </p:cNvPr>
-          <p:cNvSpPr/>
-          <p:nvPr/>
-        </p:nvSpPr>
-        <p:spPr>
-          <a:xfrm>
-            <a:off x="6249879" y="2494208"/>
-            <a:ext cx="4580878" cy="3737916"/>
-          </a:xfrm>
-          <a:prstGeom prst="rect">
-            <a:avLst/>
-          </a:prstGeom>
-          <a:noFill/>
-          <a:ln w="76200">
-            <a:solidFill>
-              <a:srgbClr val="0070C0"/>
-            </a:solidFill>
-          </a:ln>
-        </p:spPr>
-        <p:style>
-          <a:lnRef idx="2">
-            <a:schemeClr val="accent1">
-              <a:shade val="50000"/>
-            </a:schemeClr>
-          </a:lnRef>
-          <a:fillRef idx="1">
-            <a:schemeClr val="accent1"/>
-          </a:fillRef>
-          <a:effectRef idx="0">
-            <a:schemeClr val="accent1"/>
-          </a:effectRef>
-          <a:fontRef idx="minor">
-            <a:schemeClr val="lt1"/>
-          </a:fontRef>
-        </p:style>
-        <p:txBody>
-          <a:bodyPr rtlCol="0" anchor="ctr"/>
-          <a:lstStyle/>
-          <a:p>
-            <a:pPr algn="ctr"/>
-            <a:endParaRPr lang="en-SG"/>
-          </a:p>
-        </p:txBody>
-      </p:sp>
-      <p:cxnSp>
-        <p:nvCxnSpPr>
-          <p:cNvPr id="14" name="Straight Arrow Connector 13">
-            <a:extLst>
-              <a:ext uri="{FF2B5EF4-FFF2-40B4-BE49-F238E27FC236}">
-                <a16:creationId xmlns:a16="http://schemas.microsoft.com/office/drawing/2014/main" id="{DB8D61EE-C5ED-4BF5-887F-F9374D2BC182}"/>
-              </a:ext>
-            </a:extLst>
-          </p:cNvPr>
-          <p:cNvCxnSpPr>
-            <a:cxnSpLocks/>
-            <a:stCxn id="13" idx="3"/>
-          </p:cNvCxnSpPr>
-          <p:nvPr/>
-        </p:nvCxnSpPr>
-        <p:spPr>
-          <a:xfrm flipV="1">
-            <a:off x="1294003" y="3156802"/>
-            <a:ext cx="392754" cy="536798"/>
-          </a:xfrm>
-          <a:prstGeom prst="straightConnector1">
-            <a:avLst/>
-          </a:prstGeom>
-          <a:ln w="38100">
-            <a:solidFill>
-              <a:schemeClr val="tx1"/>
-            </a:solidFill>
-            <a:tailEnd type="triangle"/>
-          </a:ln>
-        </p:spPr>
-        <p:style>
-          <a:lnRef idx="1">
-            <a:schemeClr val="accent1"/>
-          </a:lnRef>
-          <a:fillRef idx="0">
-            <a:schemeClr val="accent1"/>
-          </a:fillRef>
-          <a:effectRef idx="0">
-            <a:schemeClr val="accent1"/>
-          </a:effectRef>
-          <a:fontRef idx="minor">
-            <a:schemeClr val="tx1"/>
-          </a:fontRef>
-        </p:style>
-      </p:cxnSp>
-      <p:cxnSp>
-        <p:nvCxnSpPr>
-          <p:cNvPr id="8" name="Straight Arrow Connector 7">
-            <a:extLst>
-              <a:ext uri="{FF2B5EF4-FFF2-40B4-BE49-F238E27FC236}">
-                <a16:creationId xmlns:a16="http://schemas.microsoft.com/office/drawing/2014/main" id="{1FE4068B-0C0A-4DB4-AA16-120E286D31ED}"/>
-              </a:ext>
-            </a:extLst>
-          </p:cNvPr>
-          <p:cNvCxnSpPr>
-            <a:stCxn id="6" idx="3"/>
-          </p:cNvCxnSpPr>
-          <p:nvPr/>
-        </p:nvCxnSpPr>
-        <p:spPr>
-          <a:xfrm flipV="1">
-            <a:off x="1205779" y="1118586"/>
-            <a:ext cx="543122" cy="83469"/>
-          </a:xfrm>
-          <a:prstGeom prst="straightConnector1">
-            <a:avLst/>
-          </a:prstGeom>
-          <a:ln w="38100">
-            <a:solidFill>
-              <a:schemeClr val="tx1"/>
-            </a:solidFill>
-            <a:tailEnd type="triangle"/>
-          </a:ln>
-        </p:spPr>
-        <p:style>
-          <a:lnRef idx="1">
-            <a:schemeClr val="accent1"/>
-          </a:lnRef>
-          <a:fillRef idx="0">
-            <a:schemeClr val="accent1"/>
-          </a:fillRef>
-          <a:effectRef idx="0">
-            <a:schemeClr val="accent1"/>
-          </a:effectRef>
-          <a:fontRef idx="minor">
-            <a:schemeClr val="tx1"/>
-          </a:fontRef>
-        </p:style>
-      </p:cxnSp>
-      <p:cxnSp>
-        <p:nvCxnSpPr>
-          <p:cNvPr id="10" name="Straight Arrow Connector 9">
-            <a:extLst>
-              <a:ext uri="{FF2B5EF4-FFF2-40B4-BE49-F238E27FC236}">
-                <a16:creationId xmlns:a16="http://schemas.microsoft.com/office/drawing/2014/main" id="{9EB20FAB-429B-4D49-9652-0FC2A4F1CBD8}"/>
-              </a:ext>
-            </a:extLst>
-          </p:cNvPr>
-          <p:cNvCxnSpPr>
-            <a:stCxn id="9" idx="3"/>
-          </p:cNvCxnSpPr>
-          <p:nvPr/>
-        </p:nvCxnSpPr>
-        <p:spPr>
-          <a:xfrm flipV="1">
-            <a:off x="899857" y="2087575"/>
-            <a:ext cx="933486" cy="83468"/>
-          </a:xfrm>
-          <a:prstGeom prst="straightConnector1">
-            <a:avLst/>
-          </a:prstGeom>
-          <a:ln w="38100">
-            <a:solidFill>
-              <a:schemeClr val="tx1"/>
-            </a:solidFill>
-            <a:tailEnd type="triangle"/>
-          </a:ln>
-        </p:spPr>
-        <p:style>
-          <a:lnRef idx="1">
-            <a:schemeClr val="accent1"/>
-          </a:lnRef>
-          <a:fillRef idx="0">
-            <a:schemeClr val="accent1"/>
-          </a:fillRef>
-          <a:effectRef idx="0">
-            <a:schemeClr val="accent1"/>
-          </a:effectRef>
-          <a:fontRef idx="minor">
-            <a:schemeClr val="tx1"/>
-          </a:fontRef>
-        </p:style>
-      </p:cxnSp>
-      <p:sp>
-        <p:nvSpPr>
-          <p:cNvPr id="20" name="TextBox 19">
-            <a:extLst>
-              <a:ext uri="{FF2B5EF4-FFF2-40B4-BE49-F238E27FC236}">
-                <a16:creationId xmlns:a16="http://schemas.microsoft.com/office/drawing/2014/main" id="{42804AA1-6F93-4AC4-AFB5-F6A4ED708D61}"/>
-              </a:ext>
-            </a:extLst>
-          </p:cNvPr>
-          <p:cNvSpPr txBox="1"/>
-          <p:nvPr/>
-        </p:nvSpPr>
-        <p:spPr>
-          <a:xfrm>
-            <a:off x="10990556" y="3638833"/>
-            <a:ext cx="980974" cy="646331"/>
-          </a:xfrm>
-          <a:prstGeom prst="rect">
-            <a:avLst/>
-          </a:prstGeom>
-          <a:noFill/>
-        </p:spPr>
-        <p:txBody>
-          <a:bodyPr wrap="none" rtlCol="0">
-            <a:spAutoFit/>
-          </a:bodyPr>
-          <a:lstStyle/>
-          <a:p>
-            <a:r>
-              <a:rPr lang="en-SG" dirty="0">
-                <a:ln w="3175">
-                  <a:noFill/>
-                </a:ln>
-              </a:rPr>
-              <a:t>Itinerary</a:t>
-            </a:r>
-          </a:p>
-          <a:p>
-            <a:pPr algn="ctr"/>
-            <a:r>
-              <a:rPr lang="en-SG" dirty="0">
-                <a:ln w="3175">
-                  <a:noFill/>
-                </a:ln>
-              </a:rPr>
-              <a:t> Panel</a:t>
-            </a:r>
-          </a:p>
-        </p:txBody>
-      </p:sp>
-      <p:cxnSp>
-        <p:nvCxnSpPr>
-          <p:cNvPr id="21" name="Straight Arrow Connector 20">
-            <a:extLst>
-              <a:ext uri="{FF2B5EF4-FFF2-40B4-BE49-F238E27FC236}">
-                <a16:creationId xmlns:a16="http://schemas.microsoft.com/office/drawing/2014/main" id="{C0F39AC8-7567-4670-93CE-682029F2BE40}"/>
-              </a:ext>
-            </a:extLst>
-          </p:cNvPr>
-          <p:cNvCxnSpPr>
-            <a:cxnSpLocks/>
-          </p:cNvCxnSpPr>
-          <p:nvPr/>
-        </p:nvCxnSpPr>
-        <p:spPr>
-          <a:xfrm flipH="1">
-            <a:off x="10528917" y="3961999"/>
-            <a:ext cx="496873" cy="281527"/>
-          </a:xfrm>
-          <a:prstGeom prst="straightConnector1">
-            <a:avLst/>
-          </a:prstGeom>
-          <a:ln w="38100">
-            <a:solidFill>
-              <a:schemeClr val="tx1"/>
-            </a:solidFill>
-            <a:tailEnd type="triangle"/>
-          </a:ln>
-        </p:spPr>
-        <p:style>
-          <a:lnRef idx="1">
-            <a:schemeClr val="accent1"/>
-          </a:lnRef>
-          <a:fillRef idx="0">
-            <a:schemeClr val="accent1"/>
-          </a:fillRef>
-          <a:effectRef idx="0">
-            <a:schemeClr val="accent1"/>
-          </a:effectRef>
-          <a:fontRef idx="minor">
-            <a:schemeClr val="tx1"/>
-          </a:fontRef>
-        </p:style>
-      </p:cxnSp>
+        </p:grpSpPr>
+        <p:pic>
+          <p:nvPicPr>
+            <p:cNvPr id="4" name="Picture 3">
+              <a:extLst>
+                <a:ext uri="{FF2B5EF4-FFF2-40B4-BE49-F238E27FC236}">
+                  <a16:creationId xmlns:a16="http://schemas.microsoft.com/office/drawing/2014/main" id="{A1F6AF0F-078F-4D26-B5C4-901BB26551E5}"/>
+                </a:ext>
+              </a:extLst>
+            </p:cNvPr>
+            <p:cNvPicPr>
+              <a:picLocks noChangeAspect="1"/>
+            </p:cNvPicPr>
+            <p:nvPr/>
+          </p:nvPicPr>
+          <p:blipFill rotWithShape="1">
+            <a:blip r:embed="rId2"/>
+            <a:srcRect r="2059" b="8473"/>
+            <a:stretch/>
+          </p:blipFill>
+          <p:spPr>
+            <a:xfrm>
+              <a:off x="1526166" y="305826"/>
+              <a:ext cx="9375614" cy="6048597"/>
+            </a:xfrm>
+            <a:prstGeom prst="rect">
+              <a:avLst/>
+            </a:prstGeom>
+          </p:spPr>
+        </p:pic>
+        <p:sp>
+          <p:nvSpPr>
+            <p:cNvPr id="5" name="Rectangle 4">
+              <a:extLst>
+                <a:ext uri="{FF2B5EF4-FFF2-40B4-BE49-F238E27FC236}">
+                  <a16:creationId xmlns:a16="http://schemas.microsoft.com/office/drawing/2014/main" id="{79BACA73-2A24-4F44-BB6A-A50621B37B5A}"/>
+                </a:ext>
+              </a:extLst>
+            </p:cNvPr>
+            <p:cNvSpPr/>
+            <p:nvPr/>
+          </p:nvSpPr>
+          <p:spPr>
+            <a:xfrm>
+              <a:off x="1580225" y="878889"/>
+              <a:ext cx="9250532" cy="479394"/>
+            </a:xfrm>
+            <a:prstGeom prst="rect">
+              <a:avLst/>
+            </a:prstGeom>
+            <a:noFill/>
+            <a:ln w="38100">
+              <a:solidFill>
+                <a:srgbClr val="FF0000"/>
+              </a:solidFill>
+            </a:ln>
+          </p:spPr>
+          <p:style>
+            <a:lnRef idx="2">
+              <a:schemeClr val="accent1">
+                <a:shade val="50000"/>
+              </a:schemeClr>
+            </a:lnRef>
+            <a:fillRef idx="1">
+              <a:schemeClr val="accent1"/>
+            </a:fillRef>
+            <a:effectRef idx="0">
+              <a:schemeClr val="accent1"/>
+            </a:effectRef>
+            <a:fontRef idx="minor">
+              <a:schemeClr val="lt1"/>
+            </a:fontRef>
+          </p:style>
+          <p:txBody>
+            <a:bodyPr rtlCol="0" anchor="ctr"/>
+            <a:lstStyle/>
+            <a:p>
+              <a:pPr algn="ctr"/>
+              <a:endParaRPr lang="en-SG"/>
+            </a:p>
+          </p:txBody>
+        </p:sp>
+        <p:sp>
+          <p:nvSpPr>
+            <p:cNvPr id="6" name="TextBox 5">
+              <a:extLst>
+                <a:ext uri="{FF2B5EF4-FFF2-40B4-BE49-F238E27FC236}">
+                  <a16:creationId xmlns:a16="http://schemas.microsoft.com/office/drawing/2014/main" id="{5A1FE517-755A-4298-A59E-7ED79131C051}"/>
+                </a:ext>
+              </a:extLst>
+            </p:cNvPr>
+            <p:cNvSpPr txBox="1"/>
+            <p:nvPr/>
+          </p:nvSpPr>
+          <p:spPr>
+            <a:xfrm>
+              <a:off x="2041864" y="933920"/>
+              <a:ext cx="1970843" cy="369332"/>
+            </a:xfrm>
+            <a:prstGeom prst="rect">
+              <a:avLst/>
+            </a:prstGeom>
+            <a:noFill/>
+          </p:spPr>
+          <p:txBody>
+            <a:bodyPr wrap="square" rtlCol="0">
+              <a:spAutoFit/>
+            </a:bodyPr>
+            <a:lstStyle/>
+            <a:p>
+              <a:r>
+                <a:rPr lang="en-SG" dirty="0">
+                  <a:solidFill>
+                    <a:srgbClr val="FF0000"/>
+                  </a:solidFill>
+                </a:rPr>
+                <a:t>Command Box</a:t>
+              </a:r>
+            </a:p>
+          </p:txBody>
+        </p:sp>
+        <p:sp>
+          <p:nvSpPr>
+            <p:cNvPr id="9" name="TextBox 8">
+              <a:extLst>
+                <a:ext uri="{FF2B5EF4-FFF2-40B4-BE49-F238E27FC236}">
+                  <a16:creationId xmlns:a16="http://schemas.microsoft.com/office/drawing/2014/main" id="{412C1063-9131-468A-A214-8AA3949DD52D}"/>
+                </a:ext>
+              </a:extLst>
+            </p:cNvPr>
+            <p:cNvSpPr txBox="1"/>
+            <p:nvPr/>
+          </p:nvSpPr>
+          <p:spPr>
+            <a:xfrm>
+              <a:off x="2041864" y="1868612"/>
+              <a:ext cx="1575684" cy="369332"/>
+            </a:xfrm>
+            <a:prstGeom prst="rect">
+              <a:avLst/>
+            </a:prstGeom>
+            <a:noFill/>
+          </p:spPr>
+          <p:txBody>
+            <a:bodyPr wrap="square" rtlCol="0">
+              <a:spAutoFit/>
+            </a:bodyPr>
+            <a:lstStyle/>
+            <a:p>
+              <a:r>
+                <a:rPr lang="en-SG" dirty="0">
+                  <a:ln w="3175">
+                    <a:noFill/>
+                  </a:ln>
+                  <a:solidFill>
+                    <a:srgbClr val="FF0000"/>
+                  </a:solidFill>
+                </a:rPr>
+                <a:t>Result Box</a:t>
+              </a:r>
+            </a:p>
+          </p:txBody>
+        </p:sp>
+        <p:sp>
+          <p:nvSpPr>
+            <p:cNvPr id="12" name="Rectangle 11">
+              <a:extLst>
+                <a:ext uri="{FF2B5EF4-FFF2-40B4-BE49-F238E27FC236}">
+                  <a16:creationId xmlns:a16="http://schemas.microsoft.com/office/drawing/2014/main" id="{684EDA73-B0FB-441B-87F6-B4BEAA9A0E67}"/>
+                </a:ext>
+              </a:extLst>
+            </p:cNvPr>
+            <p:cNvSpPr/>
+            <p:nvPr/>
+          </p:nvSpPr>
+          <p:spPr>
+            <a:xfrm>
+              <a:off x="1580225" y="1483232"/>
+              <a:ext cx="9250532" cy="878228"/>
+            </a:xfrm>
+            <a:prstGeom prst="rect">
+              <a:avLst/>
+            </a:prstGeom>
+            <a:noFill/>
+            <a:ln w="38100">
+              <a:solidFill>
+                <a:srgbClr val="FFFF00"/>
+              </a:solidFill>
+            </a:ln>
+          </p:spPr>
+          <p:style>
+            <a:lnRef idx="2">
+              <a:schemeClr val="accent1">
+                <a:shade val="50000"/>
+              </a:schemeClr>
+            </a:lnRef>
+            <a:fillRef idx="1">
+              <a:schemeClr val="accent1"/>
+            </a:fillRef>
+            <a:effectRef idx="0">
+              <a:schemeClr val="accent1"/>
+            </a:effectRef>
+            <a:fontRef idx="minor">
+              <a:schemeClr val="lt1"/>
+            </a:fontRef>
+          </p:style>
+          <p:txBody>
+            <a:bodyPr rtlCol="0" anchor="ctr"/>
+            <a:lstStyle/>
+            <a:p>
+              <a:pPr algn="ctr"/>
+              <a:endParaRPr lang="en-SG"/>
+            </a:p>
+          </p:txBody>
+        </p:sp>
+        <p:sp>
+          <p:nvSpPr>
+            <p:cNvPr id="13" name="TextBox 12">
+              <a:extLst>
+                <a:ext uri="{FF2B5EF4-FFF2-40B4-BE49-F238E27FC236}">
+                  <a16:creationId xmlns:a16="http://schemas.microsoft.com/office/drawing/2014/main" id="{F2B45F3D-6659-461B-9EA5-832BD5C7AECD}"/>
+                </a:ext>
+              </a:extLst>
+            </p:cNvPr>
+            <p:cNvSpPr txBox="1"/>
+            <p:nvPr/>
+          </p:nvSpPr>
+          <p:spPr>
+            <a:xfrm>
+              <a:off x="4141536" y="2598076"/>
+              <a:ext cx="3226930" cy="369332"/>
+            </a:xfrm>
+            <a:prstGeom prst="rect">
+              <a:avLst/>
+            </a:prstGeom>
+            <a:noFill/>
+          </p:spPr>
+          <p:txBody>
+            <a:bodyPr wrap="square" rtlCol="0">
+              <a:spAutoFit/>
+            </a:bodyPr>
+            <a:lstStyle/>
+            <a:p>
+              <a:r>
+                <a:rPr lang="en-SG" dirty="0">
+                  <a:ln w="3175">
+                    <a:noFill/>
+                  </a:ln>
+                  <a:solidFill>
+                    <a:srgbClr val="FF0000"/>
+                  </a:solidFill>
+                </a:rPr>
+                <a:t>Attractions Panel</a:t>
+              </a:r>
+            </a:p>
+          </p:txBody>
+        </p:sp>
+        <p:sp>
+          <p:nvSpPr>
+            <p:cNvPr id="17" name="Rectangle 16">
+              <a:extLst>
+                <a:ext uri="{FF2B5EF4-FFF2-40B4-BE49-F238E27FC236}">
+                  <a16:creationId xmlns:a16="http://schemas.microsoft.com/office/drawing/2014/main" id="{C5A1F5BA-987B-4DBF-9800-962301479716}"/>
+                </a:ext>
+              </a:extLst>
+            </p:cNvPr>
+            <p:cNvSpPr/>
+            <p:nvPr/>
+          </p:nvSpPr>
+          <p:spPr>
+            <a:xfrm>
+              <a:off x="1580225" y="2494208"/>
+              <a:ext cx="4580878" cy="3737916"/>
+            </a:xfrm>
+            <a:prstGeom prst="rect">
+              <a:avLst/>
+            </a:prstGeom>
+            <a:noFill/>
+            <a:ln w="38100">
+              <a:solidFill>
+                <a:srgbClr val="00B050"/>
+              </a:solidFill>
+            </a:ln>
+          </p:spPr>
+          <p:style>
+            <a:lnRef idx="2">
+              <a:schemeClr val="accent1">
+                <a:shade val="50000"/>
+              </a:schemeClr>
+            </a:lnRef>
+            <a:fillRef idx="1">
+              <a:schemeClr val="accent1"/>
+            </a:fillRef>
+            <a:effectRef idx="0">
+              <a:schemeClr val="accent1"/>
+            </a:effectRef>
+            <a:fontRef idx="minor">
+              <a:schemeClr val="lt1"/>
+            </a:fontRef>
+          </p:style>
+          <p:txBody>
+            <a:bodyPr rtlCol="0" anchor="ctr"/>
+            <a:lstStyle/>
+            <a:p>
+              <a:pPr algn="ctr"/>
+              <a:endParaRPr lang="en-SG"/>
+            </a:p>
+          </p:txBody>
+        </p:sp>
+        <p:sp>
+          <p:nvSpPr>
+            <p:cNvPr id="19" name="Rectangle 18">
+              <a:extLst>
+                <a:ext uri="{FF2B5EF4-FFF2-40B4-BE49-F238E27FC236}">
+                  <a16:creationId xmlns:a16="http://schemas.microsoft.com/office/drawing/2014/main" id="{2D36BB77-F985-412B-8295-A8366764B3FB}"/>
+                </a:ext>
+              </a:extLst>
+            </p:cNvPr>
+            <p:cNvSpPr/>
+            <p:nvPr/>
+          </p:nvSpPr>
+          <p:spPr>
+            <a:xfrm>
+              <a:off x="6249879" y="2494208"/>
+              <a:ext cx="4580878" cy="3737916"/>
+            </a:xfrm>
+            <a:prstGeom prst="rect">
+              <a:avLst/>
+            </a:prstGeom>
+            <a:noFill/>
+            <a:ln w="38100">
+              <a:solidFill>
+                <a:srgbClr val="0070C0"/>
+              </a:solidFill>
+            </a:ln>
+          </p:spPr>
+          <p:style>
+            <a:lnRef idx="2">
+              <a:schemeClr val="accent1">
+                <a:shade val="50000"/>
+              </a:schemeClr>
+            </a:lnRef>
+            <a:fillRef idx="1">
+              <a:schemeClr val="accent1"/>
+            </a:fillRef>
+            <a:effectRef idx="0">
+              <a:schemeClr val="accent1"/>
+            </a:effectRef>
+            <a:fontRef idx="minor">
+              <a:schemeClr val="lt1"/>
+            </a:fontRef>
+          </p:style>
+          <p:txBody>
+            <a:bodyPr rtlCol="0" anchor="ctr"/>
+            <a:lstStyle/>
+            <a:p>
+              <a:pPr algn="ctr"/>
+              <a:endParaRPr lang="en-SG"/>
+            </a:p>
+          </p:txBody>
+        </p:sp>
+        <p:sp>
+          <p:nvSpPr>
+            <p:cNvPr id="20" name="TextBox 19">
+              <a:extLst>
+                <a:ext uri="{FF2B5EF4-FFF2-40B4-BE49-F238E27FC236}">
+                  <a16:creationId xmlns:a16="http://schemas.microsoft.com/office/drawing/2014/main" id="{42804AA1-6F93-4AC4-AFB5-F6A4ED708D61}"/>
+                </a:ext>
+              </a:extLst>
+            </p:cNvPr>
+            <p:cNvSpPr txBox="1"/>
+            <p:nvPr/>
+          </p:nvSpPr>
+          <p:spPr>
+            <a:xfrm>
+              <a:off x="8868793" y="2580195"/>
+              <a:ext cx="1742982" cy="369332"/>
+            </a:xfrm>
+            <a:prstGeom prst="rect">
+              <a:avLst/>
+            </a:prstGeom>
+            <a:noFill/>
+          </p:spPr>
+          <p:txBody>
+            <a:bodyPr wrap="square" rtlCol="0">
+              <a:spAutoFit/>
+            </a:bodyPr>
+            <a:lstStyle/>
+            <a:p>
+              <a:r>
+                <a:rPr lang="en-SG" dirty="0">
+                  <a:ln w="3175">
+                    <a:noFill/>
+                  </a:ln>
+                  <a:solidFill>
+                    <a:srgbClr val="FF0000"/>
+                  </a:solidFill>
+                </a:rPr>
+                <a:t>Itinerary Panel</a:t>
+              </a:r>
+            </a:p>
+          </p:txBody>
+        </p:sp>
+      </p:grpSp>
     </p:spTree>
     <p:extLst>
       <p:ext uri="{BB962C8B-B14F-4D97-AF65-F5344CB8AC3E}">

</xml_diff>